<commit_message>
top side-bar togle-swith icon setting
</commit_message>
<xml_diff>
--- a/프로젝트 기술서.pptx
+++ b/프로젝트 기술서.pptx
@@ -429,7 +429,7 @@
           <a:p>
             <a:fld id="{FD7BAC0F-D104-4962-BBB6-5B8E8613929C}" type="datetimeFigureOut">
               <a:rPr lang="ko-KR" altLang="en-US" smtClean="0"/>
-              <a:t>2022-12-10</a:t>
+              <a:t>2022-12-12</a:t>
             </a:fld>
             <a:endParaRPr lang="ko-KR" altLang="en-US"/>
           </a:p>
@@ -646,7 +646,7 @@
           <a:p>
             <a:fld id="{FD7BAC0F-D104-4962-BBB6-5B8E8613929C}" type="datetimeFigureOut">
               <a:rPr lang="ko-KR" altLang="en-US" smtClean="0"/>
-              <a:t>2022-12-10</a:t>
+              <a:t>2022-12-12</a:t>
             </a:fld>
             <a:endParaRPr lang="ko-KR" altLang="en-US"/>
           </a:p>
@@ -929,7 +929,7 @@
           <a:p>
             <a:fld id="{0BF3A9D1-D30E-4957-9AEC-C6E8721C8F67}" type="datetimeFigureOut">
               <a:rPr lang="ko-KR" altLang="en-US" smtClean="0"/>
-              <a:t>2022-12-10</a:t>
+              <a:t>2022-12-12</a:t>
             </a:fld>
             <a:endParaRPr lang="ko-KR" altLang="en-US"/>
           </a:p>
@@ -1099,7 +1099,7 @@
           <a:p>
             <a:fld id="{0BF3A9D1-D30E-4957-9AEC-C6E8721C8F67}" type="datetimeFigureOut">
               <a:rPr lang="ko-KR" altLang="en-US" smtClean="0"/>
-              <a:t>2022-12-10</a:t>
+              <a:t>2022-12-12</a:t>
             </a:fld>
             <a:endParaRPr lang="ko-KR" altLang="en-US"/>
           </a:p>
@@ -1345,7 +1345,7 @@
           <a:p>
             <a:fld id="{0BF3A9D1-D30E-4957-9AEC-C6E8721C8F67}" type="datetimeFigureOut">
               <a:rPr lang="ko-KR" altLang="en-US" smtClean="0"/>
-              <a:t>2022-12-10</a:t>
+              <a:t>2022-12-12</a:t>
             </a:fld>
             <a:endParaRPr lang="ko-KR" altLang="en-US"/>
           </a:p>
@@ -1577,7 +1577,7 @@
           <a:p>
             <a:fld id="{0BF3A9D1-D30E-4957-9AEC-C6E8721C8F67}" type="datetimeFigureOut">
               <a:rPr lang="ko-KR" altLang="en-US" smtClean="0"/>
-              <a:t>2022-12-10</a:t>
+              <a:t>2022-12-12</a:t>
             </a:fld>
             <a:endParaRPr lang="ko-KR" altLang="en-US"/>
           </a:p>
@@ -1944,7 +1944,7 @@
           <a:p>
             <a:fld id="{0BF3A9D1-D30E-4957-9AEC-C6E8721C8F67}" type="datetimeFigureOut">
               <a:rPr lang="ko-KR" altLang="en-US" smtClean="0"/>
-              <a:t>2022-12-10</a:t>
+              <a:t>2022-12-12</a:t>
             </a:fld>
             <a:endParaRPr lang="ko-KR" altLang="en-US"/>
           </a:p>
@@ -2062,7 +2062,7 @@
           <a:p>
             <a:fld id="{0BF3A9D1-D30E-4957-9AEC-C6E8721C8F67}" type="datetimeFigureOut">
               <a:rPr lang="ko-KR" altLang="en-US" smtClean="0"/>
-              <a:t>2022-12-10</a:t>
+              <a:t>2022-12-12</a:t>
             </a:fld>
             <a:endParaRPr lang="ko-KR" altLang="en-US"/>
           </a:p>
@@ -2157,7 +2157,7 @@
           <a:p>
             <a:fld id="{0BF3A9D1-D30E-4957-9AEC-C6E8721C8F67}" type="datetimeFigureOut">
               <a:rPr lang="ko-KR" altLang="en-US" smtClean="0"/>
-              <a:t>2022-12-10</a:t>
+              <a:t>2022-12-12</a:t>
             </a:fld>
             <a:endParaRPr lang="ko-KR" altLang="en-US"/>
           </a:p>
@@ -2609,7 +2609,7 @@
           <a:p>
             <a:fld id="{0BF3A9D1-D30E-4957-9AEC-C6E8721C8F67}" type="datetimeFigureOut">
               <a:rPr lang="ko-KR" altLang="en-US" smtClean="0"/>
-              <a:t>2022-12-10</a:t>
+              <a:t>2022-12-12</a:t>
             </a:fld>
             <a:endParaRPr lang="ko-KR" altLang="en-US"/>
           </a:p>
@@ -2862,7 +2862,7 @@
           <a:p>
             <a:fld id="{0BF3A9D1-D30E-4957-9AEC-C6E8721C8F67}" type="datetimeFigureOut">
               <a:rPr lang="ko-KR" altLang="en-US" smtClean="0"/>
-              <a:t>2022-12-10</a:t>
+              <a:t>2022-12-12</a:t>
             </a:fld>
             <a:endParaRPr lang="ko-KR" altLang="en-US"/>
           </a:p>
@@ -3032,7 +3032,7 @@
           <a:p>
             <a:fld id="{0BF3A9D1-D30E-4957-9AEC-C6E8721C8F67}" type="datetimeFigureOut">
               <a:rPr lang="ko-KR" altLang="en-US" smtClean="0"/>
-              <a:t>2022-12-10</a:t>
+              <a:t>2022-12-12</a:t>
             </a:fld>
             <a:endParaRPr lang="ko-KR" altLang="en-US"/>
           </a:p>
@@ -3212,7 +3212,7 @@
           <a:p>
             <a:fld id="{0BF3A9D1-D30E-4957-9AEC-C6E8721C8F67}" type="datetimeFigureOut">
               <a:rPr lang="ko-KR" altLang="en-US" smtClean="0"/>
-              <a:t>2022-12-10</a:t>
+              <a:t>2022-12-12</a:t>
             </a:fld>
             <a:endParaRPr lang="ko-KR" altLang="en-US"/>
           </a:p>
@@ -3476,7 +3476,7 @@
           <a:p>
             <a:fld id="{FD7BAC0F-D104-4962-BBB6-5B8E8613929C}" type="datetimeFigureOut">
               <a:rPr lang="ko-KR" altLang="en-US" smtClean="0"/>
-              <a:t>2022-12-10</a:t>
+              <a:t>2022-12-12</a:t>
             </a:fld>
             <a:endParaRPr lang="ko-KR" altLang="en-US"/>
           </a:p>
@@ -3796,7 +3796,7 @@
           <a:p>
             <a:fld id="{FD7BAC0F-D104-4962-BBB6-5B8E8613929C}" type="datetimeFigureOut">
               <a:rPr lang="ko-KR" altLang="en-US" smtClean="0"/>
-              <a:t>2022-12-10</a:t>
+              <a:t>2022-12-12</a:t>
             </a:fld>
             <a:endParaRPr lang="ko-KR" altLang="en-US"/>
           </a:p>
@@ -4209,7 +4209,7 @@
           <a:p>
             <a:fld id="{FD7BAC0F-D104-4962-BBB6-5B8E8613929C}" type="datetimeFigureOut">
               <a:rPr lang="ko-KR" altLang="en-US" smtClean="0"/>
-              <a:t>2022-12-10</a:t>
+              <a:t>2022-12-12</a:t>
             </a:fld>
             <a:endParaRPr lang="ko-KR" altLang="en-US"/>
           </a:p>
@@ -4366,7 +4366,7 @@
           <a:p>
             <a:fld id="{FD7BAC0F-D104-4962-BBB6-5B8E8613929C}" type="datetimeFigureOut">
               <a:rPr lang="ko-KR" altLang="en-US" smtClean="0"/>
-              <a:t>2022-12-10</a:t>
+              <a:t>2022-12-12</a:t>
             </a:fld>
             <a:endParaRPr lang="ko-KR" altLang="en-US"/>
           </a:p>
@@ -4492,7 +4492,7 @@
           <a:p>
             <a:fld id="{FD7BAC0F-D104-4962-BBB6-5B8E8613929C}" type="datetimeFigureOut">
               <a:rPr lang="ko-KR" altLang="en-US" smtClean="0"/>
-              <a:t>2022-12-10</a:t>
+              <a:t>2022-12-12</a:t>
             </a:fld>
             <a:endParaRPr lang="ko-KR" altLang="en-US"/>
           </a:p>
@@ -4809,7 +4809,7 @@
           <a:p>
             <a:fld id="{FD7BAC0F-D104-4962-BBB6-5B8E8613929C}" type="datetimeFigureOut">
               <a:rPr lang="ko-KR" altLang="en-US" smtClean="0"/>
-              <a:t>2022-12-10</a:t>
+              <a:t>2022-12-12</a:t>
             </a:fld>
             <a:endParaRPr lang="ko-KR" altLang="en-US"/>
           </a:p>
@@ -5102,7 +5102,7 @@
           <a:p>
             <a:fld id="{FD7BAC0F-D104-4962-BBB6-5B8E8613929C}" type="datetimeFigureOut">
               <a:rPr lang="ko-KR" altLang="en-US" smtClean="0"/>
-              <a:t>2022-12-10</a:t>
+              <a:t>2022-12-12</a:t>
             </a:fld>
             <a:endParaRPr lang="ko-KR" altLang="en-US"/>
           </a:p>
@@ -5675,7 +5675,7 @@
           <a:p>
             <a:fld id="{0BF3A9D1-D30E-4957-9AEC-C6E8721C8F67}" type="datetimeFigureOut">
               <a:rPr lang="ko-KR" altLang="en-US" smtClean="0"/>
-              <a:t>2022-12-10</a:t>
+              <a:t>2022-12-12</a:t>
             </a:fld>
             <a:endParaRPr lang="ko-KR" altLang="en-US"/>
           </a:p>
@@ -22207,15 +22207,7 @@
                   <a:srgbClr val="086492"/>
                 </a:solidFill>
               </a:rPr>
-              <a:t> </a:t>
-            </a:r>
-            <a:r>
-              <a:rPr lang="ko-KR" altLang="en-US" sz="1400" dirty="0" smtClean="0">
-                <a:solidFill>
-                  <a:srgbClr val="086492"/>
-                </a:solidFill>
-              </a:rPr>
-              <a:t>처리</a:t>
+              <a:t> 처리</a:t>
             </a:r>
             <a:endParaRPr lang="en-US" altLang="ko-KR" sz="1400" dirty="0" smtClean="0">
               <a:solidFill>
@@ -22447,11 +22439,6 @@
               </a:rPr>
               <a:t>Article/list</a:t>
             </a:r>
-            <a:endParaRPr lang="en-US" altLang="ko-KR" sz="1400" dirty="0" smtClean="0">
-              <a:solidFill>
-                <a:srgbClr val="086492"/>
-              </a:solidFill>
-            </a:endParaRPr>
           </a:p>
         </p:txBody>
       </p:sp>
@@ -28057,7 +28044,7 @@
         <p:spPr>
           <a:xfrm>
             <a:off x="289928" y="1322173"/>
-            <a:ext cx="4615366" cy="3416320"/>
+            <a:ext cx="4615366" cy="3693319"/>
           </a:xfrm>
           <a:prstGeom prst="rect">
             <a:avLst/>
@@ -28299,8 +28286,52 @@
                   <a:srgbClr val="086492"/>
                 </a:solidFill>
               </a:rPr>
-              <a:t>인증키 생성 이메일 전송</a:t>
-            </a:r>
+              <a:t>인증키 생성 이메일 </a:t>
+            </a:r>
+            <a:r>
+              <a:rPr lang="ko-KR" altLang="en-US" dirty="0" smtClean="0">
+                <a:solidFill>
+                  <a:srgbClr val="086492"/>
+                </a:solidFill>
+              </a:rPr>
+              <a:t>전송</a:t>
+            </a:r>
+            <a:endParaRPr lang="en-US" altLang="ko-KR" dirty="0" smtClean="0">
+              <a:solidFill>
+                <a:srgbClr val="086492"/>
+              </a:solidFill>
+            </a:endParaRPr>
+          </a:p>
+          <a:p>
+            <a:r>
+              <a:rPr lang="en-US" altLang="ko-KR" dirty="0">
+                <a:solidFill>
+                  <a:srgbClr val="086492"/>
+                </a:solidFill>
+              </a:rPr>
+              <a:t>	</a:t>
+            </a:r>
+            <a:r>
+              <a:rPr lang="en-US" altLang="ko-KR" dirty="0" smtClean="0">
+                <a:solidFill>
+                  <a:srgbClr val="086492"/>
+                </a:solidFill>
+              </a:rPr>
+              <a:t>- </a:t>
+            </a:r>
+            <a:r>
+              <a:rPr lang="ko-KR" altLang="en-US" dirty="0" smtClean="0">
+                <a:solidFill>
+                  <a:srgbClr val="086492"/>
+                </a:solidFill>
+              </a:rPr>
+              <a:t>프로필 사진 업로드</a:t>
+            </a:r>
+            <a:endParaRPr lang="ko-KR" altLang="en-US" dirty="0">
+              <a:solidFill>
+                <a:srgbClr val="086492"/>
+              </a:solidFill>
+            </a:endParaRPr>
           </a:p>
           <a:p>
             <a:r>
@@ -28410,7 +28441,7 @@
         <p:spPr>
           <a:xfrm>
             <a:off x="5471528" y="1322173"/>
-            <a:ext cx="3962944" cy="3416320"/>
+            <a:ext cx="4044697" cy="3416320"/>
           </a:xfrm>
           <a:prstGeom prst="rect">
             <a:avLst/>
@@ -28715,7 +28746,7 @@
               <a:t>	</a:t>
             </a:r>
             <a:r>
-              <a:rPr lang="en-US" altLang="ko-KR" strike="sngStrike" dirty="0" smtClean="0">
+              <a:rPr lang="en-US" altLang="ko-KR" dirty="0" smtClean="0">
                 <a:solidFill>
                   <a:srgbClr val="086492"/>
                 </a:solidFill>
@@ -28723,20 +28754,12 @@
               <a:t>- </a:t>
             </a:r>
             <a:r>
-              <a:rPr lang="ko-KR" altLang="en-US" strike="sngStrike" dirty="0" err="1">
-                <a:solidFill>
-                  <a:srgbClr val="086492"/>
-                </a:solidFill>
-              </a:rPr>
-              <a:t>사진업로드</a:t>
-            </a:r>
-            <a:r>
-              <a:rPr lang="ko-KR" altLang="en-US" strike="sngStrike" dirty="0">
-                <a:solidFill>
-                  <a:srgbClr val="086492"/>
-                </a:solidFill>
-              </a:rPr>
-              <a:t> 기능 </a:t>
+              <a:rPr lang="ko-KR" altLang="en-US" dirty="0" smtClean="0">
+                <a:solidFill>
+                  <a:srgbClr val="086492"/>
+                </a:solidFill>
+              </a:rPr>
+              <a:t>사진 업로드 </a:t>
             </a:r>
             <a:r>
               <a:rPr lang="ko-KR" altLang="en-US" dirty="0">
@@ -28744,7 +28767,7 @@
                   <a:srgbClr val="086492"/>
                 </a:solidFill>
               </a:rPr>
-              <a:t>           </a:t>
+              <a:t>기능            </a:t>
             </a:r>
             <a:endParaRPr lang="en-US" altLang="ko-KR" dirty="0" smtClean="0">
               <a:solidFill>
@@ -32248,7 +32271,7 @@
         <p:spPr>
           <a:xfrm>
             <a:off x="5508598" y="1322173"/>
-            <a:ext cx="3732112" cy="3970318"/>
+            <a:ext cx="3732112" cy="3693319"/>
           </a:xfrm>
           <a:prstGeom prst="rect">
             <a:avLst/>
@@ -32455,7 +32478,7 @@
               <a:t>          </a:t>
             </a:r>
             <a:r>
-              <a:rPr lang="en-US" altLang="ko-KR" strike="sngStrike" dirty="0" smtClean="0">
+              <a:rPr lang="en-US" altLang="ko-KR" dirty="0" smtClean="0">
                 <a:solidFill>
                   <a:srgbClr val="086492"/>
                 </a:solidFill>
@@ -32463,14 +32486,14 @@
               <a:t>- </a:t>
             </a:r>
             <a:r>
-              <a:rPr lang="ko-KR" altLang="en-US" strike="sngStrike" dirty="0" err="1">
+              <a:rPr lang="ko-KR" altLang="en-US" dirty="0" err="1" smtClean="0">
                 <a:solidFill>
                   <a:srgbClr val="086492"/>
                 </a:solidFill>
               </a:rPr>
               <a:t>회원조회</a:t>
             </a:r>
-            <a:endParaRPr lang="ko-KR" altLang="en-US" strike="sngStrike" dirty="0">
+            <a:endParaRPr lang="ko-KR" altLang="en-US" dirty="0">
               <a:solidFill>
                 <a:srgbClr val="086492"/>
               </a:solidFill>
@@ -32486,7 +32509,7 @@
               <a:t>          </a:t>
             </a:r>
             <a:r>
-              <a:rPr lang="en-US" altLang="ko-KR" strike="sngStrike" dirty="0" smtClean="0">
+              <a:rPr lang="en-US" altLang="ko-KR" dirty="0" smtClean="0">
                 <a:solidFill>
                   <a:srgbClr val="086492"/>
                 </a:solidFill>
@@ -32494,20 +32517,12 @@
               <a:t>- </a:t>
             </a:r>
             <a:r>
-              <a:rPr lang="ko-KR" altLang="en-US" strike="sngStrike" dirty="0" err="1">
-                <a:solidFill>
-                  <a:srgbClr val="086492"/>
-                </a:solidFill>
-              </a:rPr>
-              <a:t>권한부여</a:t>
-            </a:r>
-            <a:r>
-              <a:rPr lang="ko-KR" altLang="en-US" strike="sngStrike" dirty="0">
-                <a:solidFill>
-                  <a:srgbClr val="086492"/>
-                </a:solidFill>
-              </a:rPr>
-              <a:t> </a:t>
+              <a:rPr lang="ko-KR" altLang="en-US" dirty="0" smtClean="0">
+                <a:solidFill>
+                  <a:srgbClr val="086492"/>
+                </a:solidFill>
+              </a:rPr>
+              <a:t>공지사항 권한 부여</a:t>
             </a:r>
             <a:endParaRPr lang="en-US" altLang="ko-KR" strike="sngStrike" dirty="0" smtClean="0">
               <a:solidFill>
@@ -32525,7 +32540,7 @@
               <a:t>          </a:t>
             </a:r>
             <a:r>
-              <a:rPr lang="en-US" altLang="ko-KR" strike="sngStrike" dirty="0" smtClean="0">
+              <a:rPr lang="en-US" altLang="ko-KR" dirty="0" smtClean="0">
                 <a:solidFill>
                   <a:srgbClr val="086492"/>
                 </a:solidFill>
@@ -32533,69 +32548,22 @@
               <a:t>- </a:t>
             </a:r>
             <a:r>
-              <a:rPr lang="ko-KR" altLang="en-US" strike="sngStrike" dirty="0">
-                <a:solidFill>
-                  <a:srgbClr val="086492"/>
-                </a:solidFill>
-              </a:rPr>
-              <a:t>모든 </a:t>
-            </a:r>
-            <a:r>
-              <a:rPr lang="ko-KR" altLang="en-US" strike="sngStrike" dirty="0" err="1">
-                <a:solidFill>
-                  <a:srgbClr val="086492"/>
-                </a:solidFill>
-              </a:rPr>
-              <a:t>게시글</a:t>
-            </a:r>
-            <a:r>
-              <a:rPr lang="ko-KR" altLang="en-US" strike="sngStrike" dirty="0">
-                <a:solidFill>
-                  <a:srgbClr val="086492"/>
-                </a:solidFill>
-              </a:rPr>
-              <a:t> 권한 </a:t>
-            </a:r>
-            <a:endParaRPr lang="en-US" altLang="ko-KR" strike="sngStrike" dirty="0" smtClean="0">
-              <a:solidFill>
-                <a:srgbClr val="086492"/>
-              </a:solidFill>
-            </a:endParaRPr>
-          </a:p>
-          <a:p>
-            <a:r>
               <a:rPr lang="ko-KR" altLang="en-US" dirty="0">
                 <a:solidFill>
                   <a:srgbClr val="086492"/>
                 </a:solidFill>
               </a:rPr>
-              <a:t>          </a:t>
-            </a:r>
-            <a:r>
-              <a:rPr lang="en-US" altLang="ko-KR" strike="sngStrike" dirty="0" smtClean="0">
-                <a:solidFill>
-                  <a:srgbClr val="086492"/>
-                </a:solidFill>
-              </a:rPr>
-              <a:t>- </a:t>
-            </a:r>
-            <a:r>
-              <a:rPr lang="ko-KR" altLang="en-US" strike="sngStrike" dirty="0">
-                <a:solidFill>
-                  <a:srgbClr val="086492"/>
-                </a:solidFill>
-              </a:rPr>
               <a:t>교육일정 관리 </a:t>
             </a:r>
             <a:r>
-              <a:rPr lang="ko-KR" altLang="en-US" strike="sngStrike" dirty="0" smtClean="0">
+              <a:rPr lang="ko-KR" altLang="en-US" dirty="0" smtClean="0">
                 <a:solidFill>
                   <a:srgbClr val="086492"/>
                 </a:solidFill>
               </a:rPr>
               <a:t>권한</a:t>
             </a:r>
-            <a:endParaRPr lang="en-US" altLang="ko-KR" strike="sngStrike" dirty="0" smtClean="0">
+            <a:endParaRPr lang="en-US" altLang="ko-KR" dirty="0" smtClean="0">
               <a:solidFill>
                 <a:srgbClr val="086492"/>
               </a:solidFill>

</xml_diff>